<commit_message>
A bug fix related to embeding of images into slides for Microsoft Office fixed.
</commit_message>
<xml_diff>
--- a/sample.pptx
+++ b/sample.pptx
@@ -3325,6 +3325,15 @@
         </p:txBody>
       </p:sp>
       <p:pic>
+        <p:nvPicPr>
+          <p:cNvPr id="4" name="Content Placeholder 3"/>
+          <p:cNvPicPr>
+            <a:picLocks noGrp="1" noChangeAspect="1"/>
+          </p:cNvPicPr>
+          <p:nvPr>
+            <p:ph idx="1"/>
+          </p:nvPr>
+        </p:nvPicPr>
         <p:blipFill>
           <a:blip r:embed="rId2">
             <a:extLst>

</xml_diff>